<commit_message>
End-to-end CSK IPL Analysis Dashboard (2008–2025)
</commit_message>
<xml_diff>
--- a/dashboard/imgs/CSK_Layouts.pptx
+++ b/dashboard/imgs/CSK_Layouts.pptx
@@ -261,7 +261,7 @@
           <a:p>
             <a:fld id="{2E470861-E99B-4A76-A6B1-386BAD2E651E}" type="datetimeFigureOut">
               <a:rPr lang="en-IN" smtClean="0"/>
-              <a:t>04-12-2025</a:t>
+              <a:t>18-12-2025</a:t>
             </a:fld>
             <a:endParaRPr lang="en-IN"/>
           </a:p>
@@ -461,7 +461,7 @@
           <a:p>
             <a:fld id="{2E470861-E99B-4A76-A6B1-386BAD2E651E}" type="datetimeFigureOut">
               <a:rPr lang="en-IN" smtClean="0"/>
-              <a:t>04-12-2025</a:t>
+              <a:t>18-12-2025</a:t>
             </a:fld>
             <a:endParaRPr lang="en-IN"/>
           </a:p>
@@ -671,7 +671,7 @@
           <a:p>
             <a:fld id="{2E470861-E99B-4A76-A6B1-386BAD2E651E}" type="datetimeFigureOut">
               <a:rPr lang="en-IN" smtClean="0"/>
-              <a:t>04-12-2025</a:t>
+              <a:t>18-12-2025</a:t>
             </a:fld>
             <a:endParaRPr lang="en-IN"/>
           </a:p>
@@ -871,7 +871,7 @@
           <a:p>
             <a:fld id="{2E470861-E99B-4A76-A6B1-386BAD2E651E}" type="datetimeFigureOut">
               <a:rPr lang="en-IN" smtClean="0"/>
-              <a:t>04-12-2025</a:t>
+              <a:t>18-12-2025</a:t>
             </a:fld>
             <a:endParaRPr lang="en-IN"/>
           </a:p>
@@ -1147,7 +1147,7 @@
           <a:p>
             <a:fld id="{2E470861-E99B-4A76-A6B1-386BAD2E651E}" type="datetimeFigureOut">
               <a:rPr lang="en-IN" smtClean="0"/>
-              <a:t>04-12-2025</a:t>
+              <a:t>18-12-2025</a:t>
             </a:fld>
             <a:endParaRPr lang="en-IN"/>
           </a:p>
@@ -1415,7 +1415,7 @@
           <a:p>
             <a:fld id="{2E470861-E99B-4A76-A6B1-386BAD2E651E}" type="datetimeFigureOut">
               <a:rPr lang="en-IN" smtClean="0"/>
-              <a:t>04-12-2025</a:t>
+              <a:t>18-12-2025</a:t>
             </a:fld>
             <a:endParaRPr lang="en-IN"/>
           </a:p>
@@ -1830,7 +1830,7 @@
           <a:p>
             <a:fld id="{2E470861-E99B-4A76-A6B1-386BAD2E651E}" type="datetimeFigureOut">
               <a:rPr lang="en-IN" smtClean="0"/>
-              <a:t>04-12-2025</a:t>
+              <a:t>18-12-2025</a:t>
             </a:fld>
             <a:endParaRPr lang="en-IN"/>
           </a:p>
@@ -1972,7 +1972,7 @@
           <a:p>
             <a:fld id="{2E470861-E99B-4A76-A6B1-386BAD2E651E}" type="datetimeFigureOut">
               <a:rPr lang="en-IN" smtClean="0"/>
-              <a:t>04-12-2025</a:t>
+              <a:t>18-12-2025</a:t>
             </a:fld>
             <a:endParaRPr lang="en-IN"/>
           </a:p>
@@ -2085,7 +2085,7 @@
           <a:p>
             <a:fld id="{2E470861-E99B-4A76-A6B1-386BAD2E651E}" type="datetimeFigureOut">
               <a:rPr lang="en-IN" smtClean="0"/>
-              <a:t>04-12-2025</a:t>
+              <a:t>18-12-2025</a:t>
             </a:fld>
             <a:endParaRPr lang="en-IN"/>
           </a:p>
@@ -2398,7 +2398,7 @@
           <a:p>
             <a:fld id="{2E470861-E99B-4A76-A6B1-386BAD2E651E}" type="datetimeFigureOut">
               <a:rPr lang="en-IN" smtClean="0"/>
-              <a:t>04-12-2025</a:t>
+              <a:t>18-12-2025</a:t>
             </a:fld>
             <a:endParaRPr lang="en-IN"/>
           </a:p>
@@ -2687,7 +2687,7 @@
           <a:p>
             <a:fld id="{2E470861-E99B-4A76-A6B1-386BAD2E651E}" type="datetimeFigureOut">
               <a:rPr lang="en-IN" smtClean="0"/>
-              <a:t>04-12-2025</a:t>
+              <a:t>18-12-2025</a:t>
             </a:fld>
             <a:endParaRPr lang="en-IN"/>
           </a:p>
@@ -2930,7 +2930,7 @@
           <a:p>
             <a:fld id="{2E470861-E99B-4A76-A6B1-386BAD2E651E}" type="datetimeFigureOut">
               <a:rPr lang="en-IN" smtClean="0"/>
-              <a:t>04-12-2025</a:t>
+              <a:t>18-12-2025</a:t>
             </a:fld>
             <a:endParaRPr lang="en-IN"/>
           </a:p>
@@ -3530,8 +3530,8 @@
           </p:nvSpPr>
           <p:spPr>
             <a:xfrm>
-              <a:off x="874655" y="206947"/>
-              <a:ext cx="3131737" cy="369332"/>
+              <a:off x="874654" y="225801"/>
+              <a:ext cx="4772002" cy="369332"/>
             </a:xfrm>
             <a:prstGeom prst="rect">
               <a:avLst/>
@@ -3553,7 +3553,7 @@
                   <a:ea typeface="AirbnbCereal_W_Blk Black" panose="020B0902020203020204" pitchFamily="34" charset="-18"/>
                   <a:cs typeface="AirbnbCereal_W_Blk Black" panose="020B0902020203020204" pitchFamily="34" charset="-18"/>
                 </a:rPr>
-                <a:t>CSK IPL ANALYSIS</a:t>
+                <a:t>CSK IPL ANALYTICS</a:t>
               </a:r>
             </a:p>
           </p:txBody>

</xml_diff>